<commit_message>
Adding 1st analysis slide
</commit_message>
<xml_diff>
--- a/BigDataSlides.pptx
+++ b/BigDataSlides.pptx
@@ -5,17 +5,15 @@
     <p:sldMasterId id="2147483648" r:id="rId1"/>
   </p:sldMasterIdLst>
   <p:notesMasterIdLst>
-    <p:notesMasterId r:id="rId7"/>
+    <p:notesMasterId r:id="rId5"/>
   </p:notesMasterIdLst>
   <p:handoutMasterIdLst>
-    <p:handoutMasterId r:id="rId8"/>
+    <p:handoutMasterId r:id="rId6"/>
   </p:handoutMasterIdLst>
   <p:sldIdLst>
     <p:sldId id="256" r:id="rId2"/>
     <p:sldId id="257" r:id="rId3"/>
     <p:sldId id="258" r:id="rId4"/>
-    <p:sldId id="259" r:id="rId5"/>
-    <p:sldId id="260" r:id="rId6"/>
   </p:sldIdLst>
   <p:sldSz cx="9144000" cy="6858000" type="screen4x3"/>
   <p:notesSz cx="6858000" cy="9144000"/>
@@ -2890,8 +2888,8 @@
         </p:nvSpPr>
         <p:spPr>
           <a:xfrm>
-            <a:off x="1539875" y="836613"/>
-            <a:ext cx="6502400" cy="4706937"/>
+            <a:off x="1545833" y="980678"/>
+            <a:ext cx="6502400" cy="4896643"/>
           </a:xfrm>
         </p:spPr>
         <p:txBody>
@@ -2908,7 +2906,40 @@
                 <a:latin typeface="Verdana" pitchFamily="34" charset="0"/>
                 <a:ea typeface="굴림" charset="-127"/>
               </a:rPr>
-              <a:t>Your Text here</a:t>
+              <a:t>Global terrorism database at Kaggle (</a:t>
+            </a:r>
+            <a:r>
+              <a:rPr lang="en-US" altLang="ko-KR" sz="2000" dirty="0">
+                <a:latin typeface="Verdana" pitchFamily="34" charset="0"/>
+                <a:ea typeface="굴림" charset="-127"/>
+                <a:hlinkClick r:id="rId2"/>
+              </a:rPr>
+              <a:t>https://www.kaggle.com/START-UMD/gtd</a:t>
+            </a:r>
+            <a:r>
+              <a:rPr lang="en-US" altLang="ko-KR" sz="2000" dirty="0">
+                <a:latin typeface="Verdana" pitchFamily="34" charset="0"/>
+                <a:ea typeface="굴림" charset="-127"/>
+              </a:rPr>
+              <a:t>)</a:t>
+            </a:r>
+          </a:p>
+          <a:p>
+            <a:pPr marL="0" indent="0">
+              <a:buNone/>
+            </a:pPr>
+            <a:endParaRPr lang="en-US" sz="2000" b="1" dirty="0"/>
+          </a:p>
+          <a:p>
+            <a:r>
+              <a:rPr lang="en-US" sz="2000" dirty="0"/>
+              <a:t>The Global Terrorism Database (GTD) is an open-source database including information on terrorist attacks around the world from 1970 through 2017. </a:t>
+            </a:r>
+          </a:p>
+          <a:p>
+            <a:r>
+              <a:rPr lang="en-US" sz="2000" dirty="0"/>
+              <a:t>The GTD includes systematic data on domestic as well as international terrorist incidents that have occurred during this time period and now includes more than 180,000 attacks. The database is maintained by researchers at the National Consortium for the Study of Terrorism and Responses to Terrorism (START), headquartered at the University of Maryland.</a:t>
             </a:r>
           </a:p>
           <a:p>
@@ -2921,50 +2952,6 @@
               <a:latin typeface="Verdana" pitchFamily="34" charset="0"/>
               <a:ea typeface="굴림" charset="-127"/>
             </a:endParaRPr>
-          </a:p>
-          <a:p>
-            <a:pPr>
-              <a:lnSpc>
-                <a:spcPct val="80000"/>
-              </a:lnSpc>
-            </a:pPr>
-            <a:r>
-              <a:rPr lang="ru-RU" altLang="ko-KR" sz="2000" dirty="0">
-                <a:latin typeface="Verdana" pitchFamily="34" charset="0"/>
-                <a:ea typeface="굴림" charset="-127"/>
-              </a:rPr>
-              <a:t>Lorem ipsum dolor sit amet, consectetuer adipiscing elit, sed diam nonummy nibh euismod tincidunt ut laoreet dolore magna aliquam erat volutpat. Ut wisi enim ad minim veniam, quis nostrud exerci tation ullamcorper suscipit lobortis nisl ut aliquip ex ea commodo consequat. </a:t>
-            </a:r>
-            <a:endParaRPr lang="en-US" altLang="ko-KR" sz="2000" dirty="0">
-              <a:latin typeface="Verdana" pitchFamily="34" charset="0"/>
-              <a:ea typeface="굴림" charset="-127"/>
-            </a:endParaRPr>
-          </a:p>
-          <a:p>
-            <a:pPr>
-              <a:lnSpc>
-                <a:spcPct val="80000"/>
-              </a:lnSpc>
-            </a:pPr>
-            <a:endParaRPr lang="en-US" altLang="ko-KR" sz="2000" dirty="0">
-              <a:latin typeface="Verdana" pitchFamily="34" charset="0"/>
-              <a:ea typeface="굴림" charset="-127"/>
-            </a:endParaRPr>
-          </a:p>
-          <a:p>
-            <a:pPr>
-              <a:lnSpc>
-                <a:spcPct val="80000"/>
-              </a:lnSpc>
-            </a:pPr>
-            <a:r>
-              <a:rPr lang="ru-RU" altLang="ko-KR" sz="2000" dirty="0">
-                <a:latin typeface="Verdana" pitchFamily="34" charset="0"/>
-                <a:ea typeface="굴림" charset="-127"/>
-              </a:rPr>
-              <a:t>Duis autem vel eum iriure dolor in hendrerit in vulputate velit esse molestie consequat, vel illum dolore eu feugiat nulla facilisis at vero eros et accumsan et iusto odio dignissim qui blandit praesent luptatum zzril delenit augue duis dolore te feugait nulla facilisi. </a:t>
-            </a:r>
-            <a:endParaRPr lang="uk-UA" sz="2000" dirty="0"/>
           </a:p>
         </p:txBody>
       </p:sp>
@@ -3005,259 +2992,122 @@
           <a:chExt cx="0" cy="0"/>
         </a:xfrm>
       </p:grpSpPr>
+      <p:pic>
+        <p:nvPicPr>
+          <p:cNvPr id="5" name="Image 4">
+            <a:extLst>
+              <a:ext uri="{FF2B5EF4-FFF2-40B4-BE49-F238E27FC236}">
+                <a16:creationId xmlns:a16="http://schemas.microsoft.com/office/drawing/2014/main" id="{A556E828-489E-487A-86F4-939F5E561178}"/>
+              </a:ext>
+            </a:extLst>
+          </p:cNvPr>
+          <p:cNvPicPr>
+            <a:picLocks noChangeAspect="1"/>
+          </p:cNvPicPr>
+          <p:nvPr/>
+        </p:nvPicPr>
+        <p:blipFill>
+          <a:blip r:embed="rId3">
+            <a:extLst>
+              <a:ext uri="{28A0092B-C50C-407E-A947-70E740481C1C}">
+                <a14:useLocalDpi xmlns:a14="http://schemas.microsoft.com/office/drawing/2010/main" val="0"/>
+              </a:ext>
+            </a:extLst>
+          </a:blip>
+          <a:stretch>
+            <a:fillRect/>
+          </a:stretch>
+        </p:blipFill>
+        <p:spPr>
+          <a:xfrm>
+            <a:off x="1907704" y="1628800"/>
+            <a:ext cx="6984901" cy="3395113"/>
+          </a:xfrm>
+          <a:prstGeom prst="rect">
+            <a:avLst/>
+          </a:prstGeom>
+        </p:spPr>
+      </p:pic>
       <p:sp>
         <p:nvSpPr>
-          <p:cNvPr id="114690" name="Rectangle 2"/>
-          <p:cNvSpPr>
-            <a:spLocks noGrp="1" noChangeArrowheads="1"/>
-          </p:cNvSpPr>
-          <p:nvPr>
-            <p:ph type="title"/>
-          </p:nvPr>
+          <p:cNvPr id="6" name="ZoneTexte 5">
+            <a:extLst>
+              <a:ext uri="{FF2B5EF4-FFF2-40B4-BE49-F238E27FC236}">
+                <a16:creationId xmlns:a16="http://schemas.microsoft.com/office/drawing/2014/main" id="{8A275CEE-6C01-4902-B618-C401094F48AB}"/>
+              </a:ext>
+            </a:extLst>
+          </p:cNvPr>
+          <p:cNvSpPr txBox="1"/>
+          <p:nvPr/>
         </p:nvSpPr>
         <p:spPr>
           <a:xfrm>
-            <a:off x="1908175" y="188913"/>
-            <a:ext cx="7056438" cy="723900"/>
+            <a:off x="2051720" y="404664"/>
+            <a:ext cx="6840885" cy="830997"/>
           </a:xfrm>
+          <a:prstGeom prst="rect">
+            <a:avLst/>
+          </a:prstGeom>
+          <a:noFill/>
         </p:spPr>
         <p:txBody>
-          <a:bodyPr/>
+          <a:bodyPr wrap="square" rtlCol="0">
+            <a:spAutoFit/>
+          </a:bodyPr>
           <a:lstStyle/>
           <a:p>
-            <a:endParaRPr lang="en-US" dirty="0">
-              <a:solidFill>
-                <a:schemeClr val="tx1"/>
-              </a:solidFill>
+            <a:r>
+              <a:rPr lang="en-US" sz="2400" b="1" dirty="0">
+                <a:latin typeface="Tahoma" panose="020B0604030504040204" pitchFamily="34" charset="0"/>
+                <a:ea typeface="Tahoma" panose="020B0604030504040204" pitchFamily="34" charset="0"/>
+                <a:cs typeface="Tahoma" panose="020B0604030504040204" pitchFamily="34" charset="0"/>
+              </a:rPr>
+              <a:t>Let's start by comparing the impact of terrorism in the different countries                       </a:t>
+            </a:r>
+            <a:endParaRPr lang="fr-FR" sz="2400" b="1" dirty="0">
+              <a:latin typeface="Tahoma" panose="020B0604030504040204" pitchFamily="34" charset="0"/>
+              <a:ea typeface="Tahoma" panose="020B0604030504040204" pitchFamily="34" charset="0"/>
+              <a:cs typeface="Tahoma" panose="020B0604030504040204" pitchFamily="34" charset="0"/>
             </a:endParaRPr>
           </a:p>
         </p:txBody>
       </p:sp>
       <p:sp>
         <p:nvSpPr>
-          <p:cNvPr id="114691" name="Rectangle 3"/>
-          <p:cNvSpPr>
-            <a:spLocks noGrp="1" noChangeArrowheads="1"/>
-          </p:cNvSpPr>
-          <p:nvPr>
-            <p:ph type="body" idx="1"/>
-          </p:nvPr>
+          <p:cNvPr id="7" name="ZoneTexte 6">
+            <a:extLst>
+              <a:ext uri="{FF2B5EF4-FFF2-40B4-BE49-F238E27FC236}">
+                <a16:creationId xmlns:a16="http://schemas.microsoft.com/office/drawing/2014/main" id="{824897EB-1447-4AD0-94F6-54DB9D8AF10D}"/>
+              </a:ext>
+            </a:extLst>
+          </p:cNvPr>
+          <p:cNvSpPr txBox="1"/>
+          <p:nvPr/>
         </p:nvSpPr>
         <p:spPr>
           <a:xfrm>
-            <a:off x="1908175" y="1052513"/>
-            <a:ext cx="7056438" cy="5473700"/>
+            <a:off x="2195736" y="5373216"/>
+            <a:ext cx="6552728" cy="923330"/>
           </a:xfrm>
+          <a:prstGeom prst="rect">
+            <a:avLst/>
+          </a:prstGeom>
+          <a:noFill/>
         </p:spPr>
         <p:txBody>
-          <a:bodyPr/>
+          <a:bodyPr wrap="square" rtlCol="0">
+            <a:spAutoFit/>
+          </a:bodyPr>
           <a:lstStyle/>
           <a:p>
-            <a:endParaRPr lang="en-US">
-              <a:solidFill>
-                <a:schemeClr val="tx1"/>
-              </a:solidFill>
-            </a:endParaRPr>
+            <a:r>
+              <a:rPr lang="en-US" dirty="0"/>
+              <a:t>We can see that Philippines and Thailand are the most afflicted countries in South Asia by a large margin (Thailand has had more than 4 times as many as the third one).</a:t>
+            </a:r>
           </a:p>
         </p:txBody>
       </p:sp>
     </p:spTree>
-  </p:cSld>
-  <p:clrMapOvr>
-    <a:masterClrMapping/>
-  </p:clrMapOvr>
-</p:sld>
-</file>
-
-<file path=ppt/slides/slide4.xml><?xml version="1.0" encoding="utf-8"?>
-<p:sld xmlns:a="http://schemas.openxmlformats.org/drawingml/2006/main" xmlns:r="http://schemas.openxmlformats.org/officeDocument/2006/relationships" xmlns:p="http://schemas.openxmlformats.org/presentationml/2006/main">
-  <p:cSld>
-    <p:bg>
-      <p:bgPr>
-        <a:blipFill dpi="0" rotWithShape="0">
-          <a:blip r:embed="rId2"/>
-          <a:srcRect/>
-          <a:stretch>
-            <a:fillRect/>
-          </a:stretch>
-        </a:blipFill>
-        <a:effectLst/>
-      </p:bgPr>
-    </p:bg>
-    <p:spTree>
-      <p:nvGrpSpPr>
-        <p:cNvPr id="1" name=""/>
-        <p:cNvGrpSpPr/>
-        <p:nvPr/>
-      </p:nvGrpSpPr>
-      <p:grpSpPr>
-        <a:xfrm>
-          <a:off x="0" y="0"/>
-          <a:ext cx="0" cy="0"/>
-          <a:chOff x="0" y="0"/>
-          <a:chExt cx="0" cy="0"/>
-        </a:xfrm>
-      </p:grpSpPr>
-      <p:sp>
-        <p:nvSpPr>
-          <p:cNvPr id="114690" name="Rectangle 2"/>
-          <p:cNvSpPr>
-            <a:spLocks noGrp="1" noChangeArrowheads="1"/>
-          </p:cNvSpPr>
-          <p:nvPr>
-            <p:ph type="title"/>
-          </p:nvPr>
-        </p:nvSpPr>
-        <p:spPr>
-          <a:xfrm>
-            <a:off x="1908175" y="188913"/>
-            <a:ext cx="7056438" cy="723900"/>
-          </a:xfrm>
-        </p:spPr>
-        <p:txBody>
-          <a:bodyPr/>
-          <a:lstStyle/>
-          <a:p>
-            <a:endParaRPr lang="en-US" dirty="0">
-              <a:solidFill>
-                <a:schemeClr val="tx1"/>
-              </a:solidFill>
-            </a:endParaRPr>
-          </a:p>
-        </p:txBody>
-      </p:sp>
-      <p:sp>
-        <p:nvSpPr>
-          <p:cNvPr id="114691" name="Rectangle 3"/>
-          <p:cNvSpPr>
-            <a:spLocks noGrp="1" noChangeArrowheads="1"/>
-          </p:cNvSpPr>
-          <p:nvPr>
-            <p:ph type="body" idx="1"/>
-          </p:nvPr>
-        </p:nvSpPr>
-        <p:spPr>
-          <a:xfrm>
-            <a:off x="1908175" y="1052513"/>
-            <a:ext cx="7056438" cy="5473700"/>
-          </a:xfrm>
-        </p:spPr>
-        <p:txBody>
-          <a:bodyPr/>
-          <a:lstStyle/>
-          <a:p>
-            <a:endParaRPr lang="en-US">
-              <a:solidFill>
-                <a:schemeClr val="tx1"/>
-              </a:solidFill>
-            </a:endParaRPr>
-          </a:p>
-        </p:txBody>
-      </p:sp>
-    </p:spTree>
-    <p:extLst>
-      <p:ext uri="{BB962C8B-B14F-4D97-AF65-F5344CB8AC3E}">
-        <p14:creationId xmlns:p14="http://schemas.microsoft.com/office/powerpoint/2010/main" val="2881012713"/>
-      </p:ext>
-    </p:extLst>
-  </p:cSld>
-  <p:clrMapOvr>
-    <a:masterClrMapping/>
-  </p:clrMapOvr>
-</p:sld>
-</file>
-
-<file path=ppt/slides/slide5.xml><?xml version="1.0" encoding="utf-8"?>
-<p:sld xmlns:a="http://schemas.openxmlformats.org/drawingml/2006/main" xmlns:r="http://schemas.openxmlformats.org/officeDocument/2006/relationships" xmlns:p="http://schemas.openxmlformats.org/presentationml/2006/main">
-  <p:cSld>
-    <p:bg>
-      <p:bgPr>
-        <a:blipFill dpi="0" rotWithShape="0">
-          <a:blip r:embed="rId2"/>
-          <a:srcRect/>
-          <a:stretch>
-            <a:fillRect/>
-          </a:stretch>
-        </a:blipFill>
-        <a:effectLst/>
-      </p:bgPr>
-    </p:bg>
-    <p:spTree>
-      <p:nvGrpSpPr>
-        <p:cNvPr id="1" name=""/>
-        <p:cNvGrpSpPr/>
-        <p:nvPr/>
-      </p:nvGrpSpPr>
-      <p:grpSpPr>
-        <a:xfrm>
-          <a:off x="0" y="0"/>
-          <a:ext cx="0" cy="0"/>
-          <a:chOff x="0" y="0"/>
-          <a:chExt cx="0" cy="0"/>
-        </a:xfrm>
-      </p:grpSpPr>
-      <p:sp>
-        <p:nvSpPr>
-          <p:cNvPr id="114690" name="Rectangle 2"/>
-          <p:cNvSpPr>
-            <a:spLocks noGrp="1" noChangeArrowheads="1"/>
-          </p:cNvSpPr>
-          <p:nvPr>
-            <p:ph type="title"/>
-          </p:nvPr>
-        </p:nvSpPr>
-        <p:spPr>
-          <a:xfrm>
-            <a:off x="1908175" y="188913"/>
-            <a:ext cx="7056438" cy="723900"/>
-          </a:xfrm>
-        </p:spPr>
-        <p:txBody>
-          <a:bodyPr/>
-          <a:lstStyle/>
-          <a:p>
-            <a:endParaRPr lang="en-US" dirty="0">
-              <a:solidFill>
-                <a:schemeClr val="tx1"/>
-              </a:solidFill>
-            </a:endParaRPr>
-          </a:p>
-        </p:txBody>
-      </p:sp>
-      <p:sp>
-        <p:nvSpPr>
-          <p:cNvPr id="114691" name="Rectangle 3"/>
-          <p:cNvSpPr>
-            <a:spLocks noGrp="1" noChangeArrowheads="1"/>
-          </p:cNvSpPr>
-          <p:nvPr>
-            <p:ph type="body" idx="1"/>
-          </p:nvPr>
-        </p:nvSpPr>
-        <p:spPr>
-          <a:xfrm>
-            <a:off x="1908175" y="1052513"/>
-            <a:ext cx="7056438" cy="5473700"/>
-          </a:xfrm>
-        </p:spPr>
-        <p:txBody>
-          <a:bodyPr/>
-          <a:lstStyle/>
-          <a:p>
-            <a:endParaRPr lang="en-US">
-              <a:solidFill>
-                <a:schemeClr val="tx1"/>
-              </a:solidFill>
-            </a:endParaRPr>
-          </a:p>
-        </p:txBody>
-      </p:sp>
-    </p:spTree>
-    <p:extLst>
-      <p:ext uri="{BB962C8B-B14F-4D97-AF65-F5344CB8AC3E}">
-        <p14:creationId xmlns:p14="http://schemas.microsoft.com/office/powerpoint/2010/main" val="4250183283"/>
-      </p:ext>
-    </p:extLst>
   </p:cSld>
   <p:clrMapOvr>
     <a:masterClrMapping/>

</xml_diff>